<commit_message>
Review Comment Corrections 2 EOD
</commit_message>
<xml_diff>
--- a/defencee.pptx
+++ b/defencee.pptx
@@ -229,7 +229,7 @@
           <a:p>
             <a:fld id="{44D117FC-D6F8-45D2-B227-F2F0FAC85A1A}" type="datetimeFigureOut">
               <a:rPr lang="en-US" smtClean="0"/>
-              <a:t>4/14/2020</a:t>
+              <a:t>4/15/2020</a:t>
             </a:fld>
             <a:endParaRPr lang="en-US"/>
           </a:p>
@@ -651,7 +651,19 @@
           <a:p>
             <a:r>
               <a:rPr lang="en-US" dirty="0"/>
-              <a:t>The relevant literature that motivates this study, and that the work that is used to </a:t>
+              <a:t>The relevant literature that motivates this study, and that the work that is used to conduct the study.</a:t>
+            </a:r>
+          </a:p>
+          <a:p>
+            <a:r>
+              <a:rPr lang="en-US" dirty="0"/>
+              <a:t>Then we look at the specific points that motivated this study.</a:t>
+            </a:r>
+          </a:p>
+          <a:p>
+            <a:r>
+              <a:rPr lang="en-US" dirty="0"/>
+              <a:t>The Objective </a:t>
             </a:r>
           </a:p>
         </p:txBody>
@@ -737,692 +749,38 @@
           <a:lstStyle/>
           <a:p>
             <a:r>
-              <a:rPr lang="en-GB" sz="1200" b="0" i="0" u="none" strike="noStrike" kern="1200" dirty="0" err="1">
-                <a:solidFill>
-                  <a:schemeClr val="tx1"/>
-                </a:solidFill>
-                <a:effectLst/>
-                <a:latin typeface="+mn-lt"/>
-                <a:ea typeface="+mn-ea"/>
-                <a:cs typeface="+mn-cs"/>
-              </a:rPr>
-              <a:t>MAVLink</a:t>
-            </a:r>
-            <a:r>
-              <a:rPr lang="en-GB" sz="1200" b="0" i="0" u="none" strike="noStrike" kern="1200" dirty="0">
-                <a:solidFill>
-                  <a:schemeClr val="tx1"/>
-                </a:solidFill>
-                <a:effectLst/>
-                <a:latin typeface="+mn-lt"/>
-                <a:ea typeface="+mn-ea"/>
-                <a:cs typeface="+mn-cs"/>
-              </a:rPr>
-              <a:t> follows a modern hybrid publish-subscribe and point-to-point design pattern: Data streams are sent / published as </a:t>
-            </a:r>
-            <a:r>
-              <a:rPr lang="en-GB" sz="1200" b="1" i="0" u="none" strike="noStrike" kern="1200" dirty="0">
-                <a:solidFill>
-                  <a:schemeClr val="tx1"/>
-                </a:solidFill>
-                <a:effectLst/>
-                <a:latin typeface="+mn-lt"/>
-                <a:ea typeface="+mn-ea"/>
-                <a:cs typeface="+mn-cs"/>
-              </a:rPr>
-              <a:t>topics</a:t>
-            </a:r>
-            <a:r>
-              <a:rPr lang="en-GB" sz="1200" b="0" i="0" u="none" strike="noStrike" kern="1200" dirty="0">
-                <a:solidFill>
-                  <a:schemeClr val="tx1"/>
-                </a:solidFill>
-                <a:effectLst/>
-                <a:latin typeface="+mn-lt"/>
-                <a:ea typeface="+mn-ea"/>
-                <a:cs typeface="+mn-cs"/>
-              </a:rPr>
-              <a:t> while configuration sub-protocols such as the </a:t>
-            </a:r>
-            <a:r>
-              <a:rPr lang="en-GB" sz="1200" b="0" i="0" u="none" strike="noStrike" kern="1200" dirty="0">
-                <a:solidFill>
-                  <a:schemeClr val="tx1"/>
-                </a:solidFill>
-                <a:effectLst/>
-                <a:latin typeface="+mn-lt"/>
-                <a:ea typeface="+mn-ea"/>
-                <a:cs typeface="+mn-cs"/>
-                <a:hlinkClick r:id="rId3"/>
-              </a:rPr>
-              <a:t>mission protocol</a:t>
-            </a:r>
-            <a:r>
-              <a:rPr lang="en-GB" sz="1200" b="0" i="0" u="none" strike="noStrike" kern="1200" dirty="0">
-                <a:solidFill>
-                  <a:schemeClr val="tx1"/>
-                </a:solidFill>
-                <a:effectLst/>
-                <a:latin typeface="+mn-lt"/>
-                <a:ea typeface="+mn-ea"/>
-                <a:cs typeface="+mn-cs"/>
-              </a:rPr>
-              <a:t> or </a:t>
-            </a:r>
-            <a:r>
-              <a:rPr lang="en-GB" sz="1200" b="0" i="0" u="none" strike="noStrike" kern="1200" dirty="0">
-                <a:solidFill>
-                  <a:schemeClr val="tx1"/>
-                </a:solidFill>
-                <a:effectLst/>
-                <a:latin typeface="+mn-lt"/>
-                <a:ea typeface="+mn-ea"/>
-                <a:cs typeface="+mn-cs"/>
-                <a:hlinkClick r:id="rId4"/>
-              </a:rPr>
-              <a:t>parameter protocol</a:t>
-            </a:r>
-            <a:r>
-              <a:rPr lang="en-GB" sz="1200" b="0" i="0" u="none" strike="noStrike" kern="1200" dirty="0">
-                <a:solidFill>
-                  <a:schemeClr val="tx1"/>
-                </a:solidFill>
-                <a:effectLst/>
-                <a:latin typeface="+mn-lt"/>
-                <a:ea typeface="+mn-ea"/>
-                <a:cs typeface="+mn-cs"/>
-              </a:rPr>
-              <a:t> are point-to-point with retransmission.</a:t>
-            </a:r>
-          </a:p>
-          <a:p>
-            <a:endParaRPr lang="en-GB" sz="1200" b="0" i="0" u="none" strike="noStrike" kern="1200" dirty="0">
-              <a:solidFill>
-                <a:schemeClr val="tx1"/>
-              </a:solidFill>
-              <a:effectLst/>
-              <a:latin typeface="+mn-lt"/>
-              <a:ea typeface="+mn-ea"/>
-              <a:cs typeface="+mn-cs"/>
-            </a:endParaRPr>
-          </a:p>
-          <a:p>
-            <a:r>
-              <a:rPr lang="en-GB" sz="1200" b="0" i="0" u="none" strike="noStrike" kern="1200" dirty="0">
-                <a:solidFill>
-                  <a:schemeClr val="tx1"/>
-                </a:solidFill>
-                <a:effectLst/>
-                <a:latin typeface="+mn-lt"/>
-                <a:ea typeface="+mn-ea"/>
-                <a:cs typeface="+mn-cs"/>
-              </a:rPr>
-              <a:t>start by creating a new MAVROS plugin</a:t>
-            </a:r>
-          </a:p>
-          <a:p>
-            <a:r>
-              <a:rPr lang="en-US" sz="1200" b="0" i="0" u="none" strike="noStrike" kern="1200" dirty="0">
-                <a:solidFill>
-                  <a:schemeClr val="tx1"/>
-                </a:solidFill>
-                <a:effectLst/>
-                <a:latin typeface="+mn-lt"/>
-                <a:ea typeface="+mn-ea"/>
-                <a:cs typeface="+mn-cs"/>
-              </a:rPr>
-              <a:t>Edit </a:t>
-            </a:r>
-            <a:r>
-              <a:rPr lang="en-US" sz="1200" b="1" i="0" u="none" strike="noStrike" kern="1200" dirty="0">
-                <a:solidFill>
-                  <a:schemeClr val="tx1"/>
-                </a:solidFill>
-                <a:effectLst/>
-                <a:latin typeface="+mn-lt"/>
-                <a:ea typeface="+mn-ea"/>
-                <a:cs typeface="+mn-cs"/>
-              </a:rPr>
-              <a:t>mavros_plugins.xml</a:t>
-            </a:r>
-            <a:r>
-              <a:rPr lang="en-US" sz="1200" b="0" i="0" u="none" strike="noStrike" kern="1200" dirty="0">
-                <a:solidFill>
-                  <a:schemeClr val="tx1"/>
-                </a:solidFill>
-                <a:effectLst/>
-                <a:latin typeface="+mn-lt"/>
-                <a:ea typeface="+mn-ea"/>
-                <a:cs typeface="+mn-cs"/>
-              </a:rPr>
-              <a:t> (in </a:t>
-            </a:r>
-            <a:r>
-              <a:rPr lang="en-US" sz="1200" b="1" i="0" u="none" strike="noStrike" kern="1200" dirty="0">
-                <a:solidFill>
-                  <a:schemeClr val="tx1"/>
-                </a:solidFill>
-                <a:effectLst/>
-                <a:latin typeface="+mn-lt"/>
-                <a:ea typeface="+mn-ea"/>
-                <a:cs typeface="+mn-cs"/>
-              </a:rPr>
-              <a:t>workspace/</a:t>
-            </a:r>
-            <a:r>
-              <a:rPr lang="en-US" sz="1200" b="1" i="0" u="none" strike="noStrike" kern="1200" dirty="0" err="1">
-                <a:solidFill>
-                  <a:schemeClr val="tx1"/>
-                </a:solidFill>
-                <a:effectLst/>
-                <a:latin typeface="+mn-lt"/>
-                <a:ea typeface="+mn-ea"/>
-                <a:cs typeface="+mn-cs"/>
-              </a:rPr>
-              <a:t>src</a:t>
-            </a:r>
-            <a:r>
-              <a:rPr lang="en-US" sz="1200" b="1" i="0" u="none" strike="noStrike" kern="1200" dirty="0">
-                <a:solidFill>
-                  <a:schemeClr val="tx1"/>
-                </a:solidFill>
-                <a:effectLst/>
-                <a:latin typeface="+mn-lt"/>
-                <a:ea typeface="+mn-ea"/>
-                <a:cs typeface="+mn-cs"/>
-              </a:rPr>
-              <a:t>/</a:t>
-            </a:r>
-            <a:r>
-              <a:rPr lang="en-US" sz="1200" b="1" i="0" u="none" strike="noStrike" kern="1200" dirty="0" err="1">
-                <a:solidFill>
-                  <a:schemeClr val="tx1"/>
-                </a:solidFill>
-                <a:effectLst/>
-                <a:latin typeface="+mn-lt"/>
-                <a:ea typeface="+mn-ea"/>
-                <a:cs typeface="+mn-cs"/>
-              </a:rPr>
-              <a:t>mavros</a:t>
-            </a:r>
-            <a:r>
-              <a:rPr lang="en-US" sz="1200" b="1" i="0" u="none" strike="noStrike" kern="1200" dirty="0">
-                <a:solidFill>
-                  <a:schemeClr val="tx1"/>
-                </a:solidFill>
-                <a:effectLst/>
-                <a:latin typeface="+mn-lt"/>
-                <a:ea typeface="+mn-ea"/>
-                <a:cs typeface="+mn-cs"/>
-              </a:rPr>
-              <a:t>/</a:t>
-            </a:r>
-            <a:r>
-              <a:rPr lang="en-US" sz="1200" b="1" i="0" u="none" strike="noStrike" kern="1200" dirty="0" err="1">
-                <a:solidFill>
-                  <a:schemeClr val="tx1"/>
-                </a:solidFill>
-                <a:effectLst/>
-                <a:latin typeface="+mn-lt"/>
-                <a:ea typeface="+mn-ea"/>
-                <a:cs typeface="+mn-cs"/>
-              </a:rPr>
-              <a:t>mavros_extras</a:t>
-            </a:r>
-            <a:r>
-              <a:rPr lang="en-US" sz="1200" b="0" i="0" u="none" strike="noStrike" kern="1200" dirty="0">
-                <a:solidFill>
-                  <a:schemeClr val="tx1"/>
-                </a:solidFill>
-                <a:effectLst/>
-                <a:latin typeface="+mn-lt"/>
-                <a:ea typeface="+mn-ea"/>
-                <a:cs typeface="+mn-cs"/>
-              </a:rPr>
-              <a:t>)</a:t>
-            </a:r>
-          </a:p>
-          <a:p>
-            <a:r>
-              <a:rPr lang="en-GB" sz="1200" b="0" i="0" u="none" strike="noStrike" kern="1200" dirty="0">
-                <a:solidFill>
-                  <a:schemeClr val="tx1"/>
-                </a:solidFill>
-                <a:effectLst/>
-                <a:latin typeface="+mn-lt"/>
-                <a:ea typeface="+mn-ea"/>
-                <a:cs typeface="+mn-cs"/>
-              </a:rPr>
-              <a:t>Edit </a:t>
-            </a:r>
-            <a:r>
-              <a:rPr lang="en-GB" sz="1200" b="1" i="0" u="none" strike="noStrike" kern="1200" dirty="0">
-                <a:solidFill>
-                  <a:schemeClr val="tx1"/>
-                </a:solidFill>
-                <a:effectLst/>
-                <a:latin typeface="+mn-lt"/>
-                <a:ea typeface="+mn-ea"/>
-                <a:cs typeface="+mn-cs"/>
-              </a:rPr>
-              <a:t>CMakeLists.txt</a:t>
-            </a:r>
-            <a:r>
-              <a:rPr lang="en-GB" sz="1200" b="0" i="0" u="none" strike="noStrike" kern="1200" dirty="0">
-                <a:solidFill>
-                  <a:schemeClr val="tx1"/>
-                </a:solidFill>
-                <a:effectLst/>
-                <a:latin typeface="+mn-lt"/>
-                <a:ea typeface="+mn-ea"/>
-                <a:cs typeface="+mn-cs"/>
-              </a:rPr>
-              <a:t> (in </a:t>
-            </a:r>
-            <a:r>
-              <a:rPr lang="en-GB" sz="1200" b="1" i="0" u="none" strike="noStrike" kern="1200" dirty="0">
-                <a:solidFill>
-                  <a:schemeClr val="tx1"/>
-                </a:solidFill>
-                <a:effectLst/>
-                <a:latin typeface="+mn-lt"/>
-                <a:ea typeface="+mn-ea"/>
-                <a:cs typeface="+mn-cs"/>
-              </a:rPr>
-              <a:t>workspace/</a:t>
-            </a:r>
-            <a:r>
-              <a:rPr lang="en-GB" sz="1200" b="1" i="0" u="none" strike="noStrike" kern="1200" dirty="0" err="1">
-                <a:solidFill>
-                  <a:schemeClr val="tx1"/>
-                </a:solidFill>
-                <a:effectLst/>
-                <a:latin typeface="+mn-lt"/>
-                <a:ea typeface="+mn-ea"/>
-                <a:cs typeface="+mn-cs"/>
-              </a:rPr>
-              <a:t>src</a:t>
-            </a:r>
-            <a:r>
-              <a:rPr lang="en-GB" sz="1200" b="1" i="0" u="none" strike="noStrike" kern="1200" dirty="0">
-                <a:solidFill>
-                  <a:schemeClr val="tx1"/>
-                </a:solidFill>
-                <a:effectLst/>
-                <a:latin typeface="+mn-lt"/>
-                <a:ea typeface="+mn-ea"/>
-                <a:cs typeface="+mn-cs"/>
-              </a:rPr>
-              <a:t>/</a:t>
-            </a:r>
-            <a:r>
-              <a:rPr lang="en-GB" sz="1200" b="1" i="0" u="none" strike="noStrike" kern="1200" dirty="0" err="1">
-                <a:solidFill>
-                  <a:schemeClr val="tx1"/>
-                </a:solidFill>
-                <a:effectLst/>
-                <a:latin typeface="+mn-lt"/>
-                <a:ea typeface="+mn-ea"/>
-                <a:cs typeface="+mn-cs"/>
-              </a:rPr>
-              <a:t>mavros</a:t>
-            </a:r>
-            <a:r>
-              <a:rPr lang="en-GB" sz="1200" b="1" i="0" u="none" strike="noStrike" kern="1200" dirty="0">
-                <a:solidFill>
-                  <a:schemeClr val="tx1"/>
-                </a:solidFill>
-                <a:effectLst/>
-                <a:latin typeface="+mn-lt"/>
-                <a:ea typeface="+mn-ea"/>
-                <a:cs typeface="+mn-cs"/>
-              </a:rPr>
-              <a:t>/</a:t>
-            </a:r>
-            <a:r>
-              <a:rPr lang="en-GB" sz="1200" b="1" i="0" u="none" strike="noStrike" kern="1200" dirty="0" err="1">
-                <a:solidFill>
-                  <a:schemeClr val="tx1"/>
-                </a:solidFill>
-                <a:effectLst/>
-                <a:latin typeface="+mn-lt"/>
-                <a:ea typeface="+mn-ea"/>
-                <a:cs typeface="+mn-cs"/>
-              </a:rPr>
-              <a:t>mavros_extras</a:t>
-            </a:r>
-            <a:r>
-              <a:rPr lang="en-GB" sz="1200" b="0" i="0" u="none" strike="noStrike" kern="1200" dirty="0">
-                <a:solidFill>
-                  <a:schemeClr val="tx1"/>
-                </a:solidFill>
-                <a:effectLst/>
-                <a:latin typeface="+mn-lt"/>
-                <a:ea typeface="+mn-ea"/>
-                <a:cs typeface="+mn-cs"/>
-              </a:rPr>
-              <a:t>)</a:t>
-            </a:r>
-          </a:p>
-          <a:p>
-            <a:r>
-              <a:rPr lang="en-GB" sz="1200" b="0" i="0" u="none" strike="noStrike" kern="1200" dirty="0">
-                <a:solidFill>
-                  <a:schemeClr val="tx1"/>
-                </a:solidFill>
-                <a:effectLst/>
-                <a:latin typeface="+mn-lt"/>
-                <a:ea typeface="+mn-ea"/>
-                <a:cs typeface="+mn-cs"/>
-              </a:rPr>
-              <a:t>Inside </a:t>
-            </a:r>
-            <a:r>
-              <a:rPr lang="en-GB" sz="1200" b="1" i="0" u="none" strike="noStrike" kern="1200" dirty="0">
-                <a:solidFill>
-                  <a:schemeClr val="tx1"/>
-                </a:solidFill>
-                <a:effectLst/>
-                <a:latin typeface="+mn-lt"/>
-                <a:ea typeface="+mn-ea"/>
-                <a:cs typeface="+mn-cs"/>
-              </a:rPr>
-              <a:t>common.xml</a:t>
-            </a:r>
-            <a:r>
-              <a:rPr lang="en-GB" sz="1200" b="0" i="0" u="none" strike="noStrike" kern="1200" dirty="0">
-                <a:solidFill>
-                  <a:schemeClr val="tx1"/>
-                </a:solidFill>
-                <a:effectLst/>
-                <a:latin typeface="+mn-lt"/>
-                <a:ea typeface="+mn-ea"/>
-                <a:cs typeface="+mn-cs"/>
-              </a:rPr>
-              <a:t> in (</a:t>
-            </a:r>
-            <a:r>
-              <a:rPr lang="en-GB" sz="1200" b="1" i="0" u="none" strike="noStrike" kern="1200" dirty="0">
-                <a:solidFill>
-                  <a:schemeClr val="tx1"/>
-                </a:solidFill>
-                <a:effectLst/>
-                <a:latin typeface="+mn-lt"/>
-                <a:ea typeface="+mn-ea"/>
-                <a:cs typeface="+mn-cs"/>
-              </a:rPr>
-              <a:t>workspace/</a:t>
-            </a:r>
-            <a:r>
-              <a:rPr lang="en-GB" sz="1200" b="1" i="0" u="none" strike="noStrike" kern="1200" dirty="0" err="1">
-                <a:solidFill>
-                  <a:schemeClr val="tx1"/>
-                </a:solidFill>
-                <a:effectLst/>
-                <a:latin typeface="+mn-lt"/>
-                <a:ea typeface="+mn-ea"/>
-                <a:cs typeface="+mn-cs"/>
-              </a:rPr>
-              <a:t>src</a:t>
-            </a:r>
-            <a:r>
-              <a:rPr lang="en-GB" sz="1200" b="1" i="0" u="none" strike="noStrike" kern="1200" dirty="0">
-                <a:solidFill>
-                  <a:schemeClr val="tx1"/>
-                </a:solidFill>
-                <a:effectLst/>
-                <a:latin typeface="+mn-lt"/>
-                <a:ea typeface="+mn-ea"/>
-                <a:cs typeface="+mn-cs"/>
-              </a:rPr>
-              <a:t>/</a:t>
-            </a:r>
-            <a:r>
-              <a:rPr lang="en-GB" sz="1200" b="1" i="0" u="none" strike="noStrike" kern="1200" dirty="0" err="1">
-                <a:solidFill>
-                  <a:schemeClr val="tx1"/>
-                </a:solidFill>
-                <a:effectLst/>
-                <a:latin typeface="+mn-lt"/>
-                <a:ea typeface="+mn-ea"/>
-                <a:cs typeface="+mn-cs"/>
-              </a:rPr>
-              <a:t>mavlink</a:t>
-            </a:r>
-            <a:r>
-              <a:rPr lang="en-GB" sz="1200" b="1" i="0" u="none" strike="noStrike" kern="1200" dirty="0">
-                <a:solidFill>
-                  <a:schemeClr val="tx1"/>
-                </a:solidFill>
-                <a:effectLst/>
-                <a:latin typeface="+mn-lt"/>
-                <a:ea typeface="+mn-ea"/>
-                <a:cs typeface="+mn-cs"/>
-              </a:rPr>
-              <a:t>/</a:t>
-            </a:r>
-            <a:r>
-              <a:rPr lang="en-GB" sz="1200" b="1" i="0" u="none" strike="noStrike" kern="1200" dirty="0" err="1">
-                <a:solidFill>
-                  <a:schemeClr val="tx1"/>
-                </a:solidFill>
-                <a:effectLst/>
-                <a:latin typeface="+mn-lt"/>
-                <a:ea typeface="+mn-ea"/>
-                <a:cs typeface="+mn-cs"/>
-              </a:rPr>
-              <a:t>message_definitions</a:t>
-            </a:r>
-            <a:r>
-              <a:rPr lang="en-GB" sz="1200" b="1" i="0" u="none" strike="noStrike" kern="1200" dirty="0">
-                <a:solidFill>
-                  <a:schemeClr val="tx1"/>
-                </a:solidFill>
-                <a:effectLst/>
-                <a:latin typeface="+mn-lt"/>
-                <a:ea typeface="+mn-ea"/>
-                <a:cs typeface="+mn-cs"/>
-              </a:rPr>
-              <a:t>/v1.0</a:t>
-            </a:r>
-            <a:r>
-              <a:rPr lang="en-GB" sz="1200" b="0" i="0" u="none" strike="noStrike" kern="1200" dirty="0">
-                <a:solidFill>
-                  <a:schemeClr val="tx1"/>
-                </a:solidFill>
-                <a:effectLst/>
-                <a:latin typeface="+mn-lt"/>
-                <a:ea typeface="+mn-ea"/>
-                <a:cs typeface="+mn-cs"/>
-              </a:rPr>
-              <a:t>),</a:t>
-            </a:r>
-          </a:p>
-          <a:p>
-            <a:endParaRPr lang="en-GB" sz="1200" b="0" i="0" u="none" strike="noStrike" kern="1200" dirty="0">
-              <a:solidFill>
-                <a:schemeClr val="tx1"/>
-              </a:solidFill>
-              <a:effectLst/>
-              <a:latin typeface="+mn-lt"/>
-              <a:ea typeface="+mn-ea"/>
-              <a:cs typeface="+mn-cs"/>
-            </a:endParaRPr>
-          </a:p>
-          <a:p>
-            <a:endParaRPr lang="en-GB" sz="1200" b="0" i="0" u="none" strike="noStrike" kern="1200" dirty="0">
-              <a:solidFill>
-                <a:schemeClr val="tx1"/>
-              </a:solidFill>
-              <a:effectLst/>
-              <a:latin typeface="+mn-lt"/>
-              <a:ea typeface="+mn-ea"/>
-              <a:cs typeface="+mn-cs"/>
-            </a:endParaRPr>
-          </a:p>
-          <a:p>
-            <a:r>
-              <a:rPr lang="en-GB" sz="1200" b="0" i="0" u="none" strike="noStrike" kern="1200" dirty="0">
-                <a:solidFill>
-                  <a:schemeClr val="tx1"/>
-                </a:solidFill>
-                <a:effectLst/>
-                <a:latin typeface="+mn-lt"/>
-                <a:ea typeface="+mn-ea"/>
-                <a:cs typeface="+mn-cs"/>
-              </a:rPr>
-              <a:t>PX4: </a:t>
-            </a:r>
-          </a:p>
-          <a:p>
-            <a:r>
-              <a:rPr lang="en-GB" sz="1200" b="0" i="0" u="none" strike="noStrike" kern="1200" dirty="0">
-                <a:solidFill>
-                  <a:schemeClr val="tx1"/>
-                </a:solidFill>
-                <a:effectLst/>
-                <a:latin typeface="+mn-lt"/>
-                <a:ea typeface="+mn-ea"/>
-                <a:cs typeface="+mn-cs"/>
-              </a:rPr>
-              <a:t>Inside </a:t>
-            </a:r>
-            <a:r>
-              <a:rPr lang="en-GB" sz="1200" b="1" i="0" u="none" strike="noStrike" kern="1200" dirty="0">
-                <a:solidFill>
-                  <a:schemeClr val="tx1"/>
-                </a:solidFill>
-                <a:effectLst/>
-                <a:latin typeface="+mn-lt"/>
-                <a:ea typeface="+mn-ea"/>
-                <a:cs typeface="+mn-cs"/>
-              </a:rPr>
-              <a:t>common.xml</a:t>
-            </a:r>
-            <a:r>
-              <a:rPr lang="en-GB" sz="1200" b="0" i="0" u="none" strike="noStrike" kern="1200" dirty="0">
-                <a:solidFill>
-                  <a:schemeClr val="tx1"/>
-                </a:solidFill>
-                <a:effectLst/>
-                <a:latin typeface="+mn-lt"/>
-                <a:ea typeface="+mn-ea"/>
-                <a:cs typeface="+mn-cs"/>
-              </a:rPr>
-              <a:t> (in </a:t>
-            </a:r>
-            <a:r>
-              <a:rPr lang="en-GB" sz="1200" b="1" i="0" u="none" strike="noStrike" kern="1200" dirty="0">
-                <a:solidFill>
-                  <a:schemeClr val="tx1"/>
-                </a:solidFill>
-                <a:effectLst/>
-                <a:latin typeface="+mn-lt"/>
-                <a:ea typeface="+mn-ea"/>
-                <a:cs typeface="+mn-cs"/>
-              </a:rPr>
-              <a:t>Firmware/</a:t>
-            </a:r>
-            <a:r>
-              <a:rPr lang="en-GB" sz="1200" b="1" i="0" u="none" strike="noStrike" kern="1200" dirty="0" err="1">
-                <a:solidFill>
-                  <a:schemeClr val="tx1"/>
-                </a:solidFill>
-                <a:effectLst/>
-                <a:latin typeface="+mn-lt"/>
-                <a:ea typeface="+mn-ea"/>
-                <a:cs typeface="+mn-cs"/>
-              </a:rPr>
-              <a:t>mavlink</a:t>
-            </a:r>
-            <a:r>
-              <a:rPr lang="en-GB" sz="1200" b="1" i="0" u="none" strike="noStrike" kern="1200" dirty="0">
-                <a:solidFill>
-                  <a:schemeClr val="tx1"/>
-                </a:solidFill>
-                <a:effectLst/>
-                <a:latin typeface="+mn-lt"/>
-                <a:ea typeface="+mn-ea"/>
-                <a:cs typeface="+mn-cs"/>
-              </a:rPr>
-              <a:t>/include/</a:t>
-            </a:r>
-            <a:r>
-              <a:rPr lang="en-GB" sz="1200" b="1" i="0" u="none" strike="noStrike" kern="1200" dirty="0" err="1">
-                <a:solidFill>
-                  <a:schemeClr val="tx1"/>
-                </a:solidFill>
-                <a:effectLst/>
-                <a:latin typeface="+mn-lt"/>
-                <a:ea typeface="+mn-ea"/>
-                <a:cs typeface="+mn-cs"/>
-              </a:rPr>
-              <a:t>mavlink</a:t>
-            </a:r>
-            <a:r>
-              <a:rPr lang="en-GB" sz="1200" b="1" i="0" u="none" strike="noStrike" kern="1200" dirty="0">
-                <a:solidFill>
-                  <a:schemeClr val="tx1"/>
-                </a:solidFill>
-                <a:effectLst/>
-                <a:latin typeface="+mn-lt"/>
-                <a:ea typeface="+mn-ea"/>
-                <a:cs typeface="+mn-cs"/>
-              </a:rPr>
-              <a:t>/v2.0/</a:t>
-            </a:r>
-            <a:r>
-              <a:rPr lang="en-GB" sz="1200" b="1" i="0" u="none" strike="noStrike" kern="1200" dirty="0" err="1">
-                <a:solidFill>
-                  <a:schemeClr val="tx1"/>
-                </a:solidFill>
-                <a:effectLst/>
-                <a:latin typeface="+mn-lt"/>
-                <a:ea typeface="+mn-ea"/>
-                <a:cs typeface="+mn-cs"/>
-              </a:rPr>
-              <a:t>message_definitions</a:t>
-            </a:r>
-            <a:r>
-              <a:rPr lang="en-GB" sz="1200" b="0" i="0" u="none" strike="noStrike" kern="1200" dirty="0">
-                <a:solidFill>
-                  <a:schemeClr val="tx1"/>
-                </a:solidFill>
-                <a:effectLst/>
-                <a:latin typeface="+mn-lt"/>
-                <a:ea typeface="+mn-ea"/>
-                <a:cs typeface="+mn-cs"/>
-              </a:rPr>
-              <a:t>), add your </a:t>
-            </a:r>
-            <a:r>
-              <a:rPr lang="en-GB" sz="1200" b="0" i="0" u="none" strike="noStrike" kern="1200" dirty="0" err="1">
-                <a:solidFill>
-                  <a:schemeClr val="tx1"/>
-                </a:solidFill>
-                <a:effectLst/>
-                <a:latin typeface="+mn-lt"/>
-                <a:ea typeface="+mn-ea"/>
-                <a:cs typeface="+mn-cs"/>
-              </a:rPr>
-              <a:t>MAVLink</a:t>
-            </a:r>
-            <a:r>
-              <a:rPr lang="en-GB" sz="1200" b="0" i="0" u="none" strike="noStrike" kern="1200" dirty="0">
-                <a:solidFill>
-                  <a:schemeClr val="tx1"/>
-                </a:solidFill>
-                <a:effectLst/>
-                <a:latin typeface="+mn-lt"/>
-                <a:ea typeface="+mn-ea"/>
-                <a:cs typeface="+mn-cs"/>
-              </a:rPr>
-              <a:t> message as following (same procedure as for MAVROS section above):</a:t>
-            </a:r>
-            <a:endParaRPr lang="en-US" dirty="0"/>
-          </a:p>
-          <a:p>
-            <a:endParaRPr lang="en-US" dirty="0"/>
+              <a:rPr lang="en-US" dirty="0"/>
+              <a:t>This is the main equation of Kernel Estimation. </a:t>
+            </a:r>
+            <a:br>
+              <a:rPr lang="en-US" dirty="0"/>
+            </a:br>
+            <a:r>
+              <a:rPr lang="en-US" dirty="0"/>
+              <a:t>If you want a estimate zeta at a time instant </a:t>
+            </a:r>
+            <a:r>
+              <a:rPr lang="en-US" dirty="0" err="1"/>
+              <a:t>tk</a:t>
+            </a:r>
+            <a:r>
+              <a:rPr lang="en-US" dirty="0"/>
+              <a:t> then you gather measurements around </a:t>
+            </a:r>
+            <a:r>
+              <a:rPr lang="en-US" dirty="0" err="1"/>
+              <a:t>tk</a:t>
+            </a:r>
+            <a:r>
+              <a:rPr lang="en-US" dirty="0"/>
+              <a:t> within a “window of observation”</a:t>
+            </a:r>
+          </a:p>
+          <a:p>
+            <a:r>
+              <a:rPr lang="en-US" dirty="0"/>
+              <a:t>Between points a and B </a:t>
+            </a:r>
           </a:p>
         </p:txBody>
       </p:sp>
@@ -1443,7 +801,7 @@
           <a:p>
             <a:fld id="{E5E98293-A3F4-4328-805F-E78DF072D2D2}" type="slidenum">
               <a:rPr lang="en-US" smtClean="0"/>
-              <a:t>23</a:t>
+              <a:t>10</a:t>
             </a:fld>
             <a:endParaRPr lang="en-US"/>
           </a:p>
@@ -1452,7 +810,7 @@
     </p:spTree>
     <p:extLst>
       <p:ext uri="{BB962C8B-B14F-4D97-AF65-F5344CB8AC3E}">
-        <p14:creationId xmlns:p14="http://schemas.microsoft.com/office/powerpoint/2010/main" val="1002529916"/>
+        <p14:creationId xmlns:p14="http://schemas.microsoft.com/office/powerpoint/2010/main" val="71381212"/>
       </p:ext>
     </p:extLst>
   </p:cSld>
@@ -1507,6 +865,776 @@
           <a:lstStyle/>
           <a:p>
             <a:r>
+              <a:rPr lang="en-GB" sz="1200" b="0" i="0" u="none" strike="noStrike" kern="1200" dirty="0" err="1">
+                <a:solidFill>
+                  <a:schemeClr val="tx1"/>
+                </a:solidFill>
+                <a:effectLst/>
+                <a:latin typeface="+mn-lt"/>
+                <a:ea typeface="+mn-ea"/>
+                <a:cs typeface="+mn-cs"/>
+              </a:rPr>
+              <a:t>MAVLink</a:t>
+            </a:r>
+            <a:r>
+              <a:rPr lang="en-GB" sz="1200" b="0" i="0" u="none" strike="noStrike" kern="1200" dirty="0">
+                <a:solidFill>
+                  <a:schemeClr val="tx1"/>
+                </a:solidFill>
+                <a:effectLst/>
+                <a:latin typeface="+mn-lt"/>
+                <a:ea typeface="+mn-ea"/>
+                <a:cs typeface="+mn-cs"/>
+              </a:rPr>
+              <a:t> follows a modern hybrid publish-subscribe and point-to-point design pattern: Data streams are sent / published as </a:t>
+            </a:r>
+            <a:r>
+              <a:rPr lang="en-GB" sz="1200" b="1" i="0" u="none" strike="noStrike" kern="1200" dirty="0">
+                <a:solidFill>
+                  <a:schemeClr val="tx1"/>
+                </a:solidFill>
+                <a:effectLst/>
+                <a:latin typeface="+mn-lt"/>
+                <a:ea typeface="+mn-ea"/>
+                <a:cs typeface="+mn-cs"/>
+              </a:rPr>
+              <a:t>topics</a:t>
+            </a:r>
+            <a:r>
+              <a:rPr lang="en-GB" sz="1200" b="0" i="0" u="none" strike="noStrike" kern="1200" dirty="0">
+                <a:solidFill>
+                  <a:schemeClr val="tx1"/>
+                </a:solidFill>
+                <a:effectLst/>
+                <a:latin typeface="+mn-lt"/>
+                <a:ea typeface="+mn-ea"/>
+                <a:cs typeface="+mn-cs"/>
+              </a:rPr>
+              <a:t> while configuration sub-protocols such as the </a:t>
+            </a:r>
+            <a:r>
+              <a:rPr lang="en-GB" sz="1200" b="0" i="0" u="none" strike="noStrike" kern="1200" dirty="0">
+                <a:solidFill>
+                  <a:schemeClr val="tx1"/>
+                </a:solidFill>
+                <a:effectLst/>
+                <a:latin typeface="+mn-lt"/>
+                <a:ea typeface="+mn-ea"/>
+                <a:cs typeface="+mn-cs"/>
+                <a:hlinkClick r:id="rId3"/>
+              </a:rPr>
+              <a:t>mission protocol</a:t>
+            </a:r>
+            <a:r>
+              <a:rPr lang="en-GB" sz="1200" b="0" i="0" u="none" strike="noStrike" kern="1200" dirty="0">
+                <a:solidFill>
+                  <a:schemeClr val="tx1"/>
+                </a:solidFill>
+                <a:effectLst/>
+                <a:latin typeface="+mn-lt"/>
+                <a:ea typeface="+mn-ea"/>
+                <a:cs typeface="+mn-cs"/>
+              </a:rPr>
+              <a:t> or </a:t>
+            </a:r>
+            <a:r>
+              <a:rPr lang="en-GB" sz="1200" b="0" i="0" u="none" strike="noStrike" kern="1200" dirty="0">
+                <a:solidFill>
+                  <a:schemeClr val="tx1"/>
+                </a:solidFill>
+                <a:effectLst/>
+                <a:latin typeface="+mn-lt"/>
+                <a:ea typeface="+mn-ea"/>
+                <a:cs typeface="+mn-cs"/>
+                <a:hlinkClick r:id="rId4"/>
+              </a:rPr>
+              <a:t>parameter protocol</a:t>
+            </a:r>
+            <a:r>
+              <a:rPr lang="en-GB" sz="1200" b="0" i="0" u="none" strike="noStrike" kern="1200" dirty="0">
+                <a:solidFill>
+                  <a:schemeClr val="tx1"/>
+                </a:solidFill>
+                <a:effectLst/>
+                <a:latin typeface="+mn-lt"/>
+                <a:ea typeface="+mn-ea"/>
+                <a:cs typeface="+mn-cs"/>
+              </a:rPr>
+              <a:t> are point-to-point with retransmission.</a:t>
+            </a:r>
+          </a:p>
+          <a:p>
+            <a:endParaRPr lang="en-GB" sz="1200" b="0" i="0" u="none" strike="noStrike" kern="1200" dirty="0">
+              <a:solidFill>
+                <a:schemeClr val="tx1"/>
+              </a:solidFill>
+              <a:effectLst/>
+              <a:latin typeface="+mn-lt"/>
+              <a:ea typeface="+mn-ea"/>
+              <a:cs typeface="+mn-cs"/>
+            </a:endParaRPr>
+          </a:p>
+          <a:p>
+            <a:r>
+              <a:rPr lang="en-GB" sz="1200" b="0" i="0" u="none" strike="noStrike" kern="1200" dirty="0">
+                <a:solidFill>
+                  <a:schemeClr val="tx1"/>
+                </a:solidFill>
+                <a:effectLst/>
+                <a:latin typeface="+mn-lt"/>
+                <a:ea typeface="+mn-ea"/>
+                <a:cs typeface="+mn-cs"/>
+              </a:rPr>
+              <a:t>start by creating a new MAVROS plugin</a:t>
+            </a:r>
+          </a:p>
+          <a:p>
+            <a:r>
+              <a:rPr lang="en-US" sz="1200" b="0" i="0" u="none" strike="noStrike" kern="1200" dirty="0">
+                <a:solidFill>
+                  <a:schemeClr val="tx1"/>
+                </a:solidFill>
+                <a:effectLst/>
+                <a:latin typeface="+mn-lt"/>
+                <a:ea typeface="+mn-ea"/>
+                <a:cs typeface="+mn-cs"/>
+              </a:rPr>
+              <a:t>Edit </a:t>
+            </a:r>
+            <a:r>
+              <a:rPr lang="en-US" sz="1200" b="1" i="0" u="none" strike="noStrike" kern="1200" dirty="0">
+                <a:solidFill>
+                  <a:schemeClr val="tx1"/>
+                </a:solidFill>
+                <a:effectLst/>
+                <a:latin typeface="+mn-lt"/>
+                <a:ea typeface="+mn-ea"/>
+                <a:cs typeface="+mn-cs"/>
+              </a:rPr>
+              <a:t>mavros_plugins.xml</a:t>
+            </a:r>
+            <a:r>
+              <a:rPr lang="en-US" sz="1200" b="0" i="0" u="none" strike="noStrike" kern="1200" dirty="0">
+                <a:solidFill>
+                  <a:schemeClr val="tx1"/>
+                </a:solidFill>
+                <a:effectLst/>
+                <a:latin typeface="+mn-lt"/>
+                <a:ea typeface="+mn-ea"/>
+                <a:cs typeface="+mn-cs"/>
+              </a:rPr>
+              <a:t> (in </a:t>
+            </a:r>
+            <a:r>
+              <a:rPr lang="en-US" sz="1200" b="1" i="0" u="none" strike="noStrike" kern="1200" dirty="0">
+                <a:solidFill>
+                  <a:schemeClr val="tx1"/>
+                </a:solidFill>
+                <a:effectLst/>
+                <a:latin typeface="+mn-lt"/>
+                <a:ea typeface="+mn-ea"/>
+                <a:cs typeface="+mn-cs"/>
+              </a:rPr>
+              <a:t>workspace/</a:t>
+            </a:r>
+            <a:r>
+              <a:rPr lang="en-US" sz="1200" b="1" i="0" u="none" strike="noStrike" kern="1200" dirty="0" err="1">
+                <a:solidFill>
+                  <a:schemeClr val="tx1"/>
+                </a:solidFill>
+                <a:effectLst/>
+                <a:latin typeface="+mn-lt"/>
+                <a:ea typeface="+mn-ea"/>
+                <a:cs typeface="+mn-cs"/>
+              </a:rPr>
+              <a:t>src</a:t>
+            </a:r>
+            <a:r>
+              <a:rPr lang="en-US" sz="1200" b="1" i="0" u="none" strike="noStrike" kern="1200" dirty="0">
+                <a:solidFill>
+                  <a:schemeClr val="tx1"/>
+                </a:solidFill>
+                <a:effectLst/>
+                <a:latin typeface="+mn-lt"/>
+                <a:ea typeface="+mn-ea"/>
+                <a:cs typeface="+mn-cs"/>
+              </a:rPr>
+              <a:t>/</a:t>
+            </a:r>
+            <a:r>
+              <a:rPr lang="en-US" sz="1200" b="1" i="0" u="none" strike="noStrike" kern="1200" dirty="0" err="1">
+                <a:solidFill>
+                  <a:schemeClr val="tx1"/>
+                </a:solidFill>
+                <a:effectLst/>
+                <a:latin typeface="+mn-lt"/>
+                <a:ea typeface="+mn-ea"/>
+                <a:cs typeface="+mn-cs"/>
+              </a:rPr>
+              <a:t>mavros</a:t>
+            </a:r>
+            <a:r>
+              <a:rPr lang="en-US" sz="1200" b="1" i="0" u="none" strike="noStrike" kern="1200" dirty="0">
+                <a:solidFill>
+                  <a:schemeClr val="tx1"/>
+                </a:solidFill>
+                <a:effectLst/>
+                <a:latin typeface="+mn-lt"/>
+                <a:ea typeface="+mn-ea"/>
+                <a:cs typeface="+mn-cs"/>
+              </a:rPr>
+              <a:t>/</a:t>
+            </a:r>
+            <a:r>
+              <a:rPr lang="en-US" sz="1200" b="1" i="0" u="none" strike="noStrike" kern="1200" dirty="0" err="1">
+                <a:solidFill>
+                  <a:schemeClr val="tx1"/>
+                </a:solidFill>
+                <a:effectLst/>
+                <a:latin typeface="+mn-lt"/>
+                <a:ea typeface="+mn-ea"/>
+                <a:cs typeface="+mn-cs"/>
+              </a:rPr>
+              <a:t>mavros_extras</a:t>
+            </a:r>
+            <a:r>
+              <a:rPr lang="en-US" sz="1200" b="0" i="0" u="none" strike="noStrike" kern="1200" dirty="0">
+                <a:solidFill>
+                  <a:schemeClr val="tx1"/>
+                </a:solidFill>
+                <a:effectLst/>
+                <a:latin typeface="+mn-lt"/>
+                <a:ea typeface="+mn-ea"/>
+                <a:cs typeface="+mn-cs"/>
+              </a:rPr>
+              <a:t>)</a:t>
+            </a:r>
+          </a:p>
+          <a:p>
+            <a:r>
+              <a:rPr lang="en-GB" sz="1200" b="0" i="0" u="none" strike="noStrike" kern="1200" dirty="0">
+                <a:solidFill>
+                  <a:schemeClr val="tx1"/>
+                </a:solidFill>
+                <a:effectLst/>
+                <a:latin typeface="+mn-lt"/>
+                <a:ea typeface="+mn-ea"/>
+                <a:cs typeface="+mn-cs"/>
+              </a:rPr>
+              <a:t>Edit </a:t>
+            </a:r>
+            <a:r>
+              <a:rPr lang="en-GB" sz="1200" b="1" i="0" u="none" strike="noStrike" kern="1200" dirty="0">
+                <a:solidFill>
+                  <a:schemeClr val="tx1"/>
+                </a:solidFill>
+                <a:effectLst/>
+                <a:latin typeface="+mn-lt"/>
+                <a:ea typeface="+mn-ea"/>
+                <a:cs typeface="+mn-cs"/>
+              </a:rPr>
+              <a:t>CMakeLists.txt</a:t>
+            </a:r>
+            <a:r>
+              <a:rPr lang="en-GB" sz="1200" b="0" i="0" u="none" strike="noStrike" kern="1200" dirty="0">
+                <a:solidFill>
+                  <a:schemeClr val="tx1"/>
+                </a:solidFill>
+                <a:effectLst/>
+                <a:latin typeface="+mn-lt"/>
+                <a:ea typeface="+mn-ea"/>
+                <a:cs typeface="+mn-cs"/>
+              </a:rPr>
+              <a:t> (in </a:t>
+            </a:r>
+            <a:r>
+              <a:rPr lang="en-GB" sz="1200" b="1" i="0" u="none" strike="noStrike" kern="1200" dirty="0">
+                <a:solidFill>
+                  <a:schemeClr val="tx1"/>
+                </a:solidFill>
+                <a:effectLst/>
+                <a:latin typeface="+mn-lt"/>
+                <a:ea typeface="+mn-ea"/>
+                <a:cs typeface="+mn-cs"/>
+              </a:rPr>
+              <a:t>workspace/</a:t>
+            </a:r>
+            <a:r>
+              <a:rPr lang="en-GB" sz="1200" b="1" i="0" u="none" strike="noStrike" kern="1200" dirty="0" err="1">
+                <a:solidFill>
+                  <a:schemeClr val="tx1"/>
+                </a:solidFill>
+                <a:effectLst/>
+                <a:latin typeface="+mn-lt"/>
+                <a:ea typeface="+mn-ea"/>
+                <a:cs typeface="+mn-cs"/>
+              </a:rPr>
+              <a:t>src</a:t>
+            </a:r>
+            <a:r>
+              <a:rPr lang="en-GB" sz="1200" b="1" i="0" u="none" strike="noStrike" kern="1200" dirty="0">
+                <a:solidFill>
+                  <a:schemeClr val="tx1"/>
+                </a:solidFill>
+                <a:effectLst/>
+                <a:latin typeface="+mn-lt"/>
+                <a:ea typeface="+mn-ea"/>
+                <a:cs typeface="+mn-cs"/>
+              </a:rPr>
+              <a:t>/</a:t>
+            </a:r>
+            <a:r>
+              <a:rPr lang="en-GB" sz="1200" b="1" i="0" u="none" strike="noStrike" kern="1200" dirty="0" err="1">
+                <a:solidFill>
+                  <a:schemeClr val="tx1"/>
+                </a:solidFill>
+                <a:effectLst/>
+                <a:latin typeface="+mn-lt"/>
+                <a:ea typeface="+mn-ea"/>
+                <a:cs typeface="+mn-cs"/>
+              </a:rPr>
+              <a:t>mavros</a:t>
+            </a:r>
+            <a:r>
+              <a:rPr lang="en-GB" sz="1200" b="1" i="0" u="none" strike="noStrike" kern="1200" dirty="0">
+                <a:solidFill>
+                  <a:schemeClr val="tx1"/>
+                </a:solidFill>
+                <a:effectLst/>
+                <a:latin typeface="+mn-lt"/>
+                <a:ea typeface="+mn-ea"/>
+                <a:cs typeface="+mn-cs"/>
+              </a:rPr>
+              <a:t>/</a:t>
+            </a:r>
+            <a:r>
+              <a:rPr lang="en-GB" sz="1200" b="1" i="0" u="none" strike="noStrike" kern="1200" dirty="0" err="1">
+                <a:solidFill>
+                  <a:schemeClr val="tx1"/>
+                </a:solidFill>
+                <a:effectLst/>
+                <a:latin typeface="+mn-lt"/>
+                <a:ea typeface="+mn-ea"/>
+                <a:cs typeface="+mn-cs"/>
+              </a:rPr>
+              <a:t>mavros_extras</a:t>
+            </a:r>
+            <a:r>
+              <a:rPr lang="en-GB" sz="1200" b="0" i="0" u="none" strike="noStrike" kern="1200" dirty="0">
+                <a:solidFill>
+                  <a:schemeClr val="tx1"/>
+                </a:solidFill>
+                <a:effectLst/>
+                <a:latin typeface="+mn-lt"/>
+                <a:ea typeface="+mn-ea"/>
+                <a:cs typeface="+mn-cs"/>
+              </a:rPr>
+              <a:t>)</a:t>
+            </a:r>
+          </a:p>
+          <a:p>
+            <a:r>
+              <a:rPr lang="en-GB" sz="1200" b="0" i="0" u="none" strike="noStrike" kern="1200" dirty="0">
+                <a:solidFill>
+                  <a:schemeClr val="tx1"/>
+                </a:solidFill>
+                <a:effectLst/>
+                <a:latin typeface="+mn-lt"/>
+                <a:ea typeface="+mn-ea"/>
+                <a:cs typeface="+mn-cs"/>
+              </a:rPr>
+              <a:t>Inside </a:t>
+            </a:r>
+            <a:r>
+              <a:rPr lang="en-GB" sz="1200" b="1" i="0" u="none" strike="noStrike" kern="1200" dirty="0">
+                <a:solidFill>
+                  <a:schemeClr val="tx1"/>
+                </a:solidFill>
+                <a:effectLst/>
+                <a:latin typeface="+mn-lt"/>
+                <a:ea typeface="+mn-ea"/>
+                <a:cs typeface="+mn-cs"/>
+              </a:rPr>
+              <a:t>common.xml</a:t>
+            </a:r>
+            <a:r>
+              <a:rPr lang="en-GB" sz="1200" b="0" i="0" u="none" strike="noStrike" kern="1200" dirty="0">
+                <a:solidFill>
+                  <a:schemeClr val="tx1"/>
+                </a:solidFill>
+                <a:effectLst/>
+                <a:latin typeface="+mn-lt"/>
+                <a:ea typeface="+mn-ea"/>
+                <a:cs typeface="+mn-cs"/>
+              </a:rPr>
+              <a:t> in (</a:t>
+            </a:r>
+            <a:r>
+              <a:rPr lang="en-GB" sz="1200" b="1" i="0" u="none" strike="noStrike" kern="1200" dirty="0">
+                <a:solidFill>
+                  <a:schemeClr val="tx1"/>
+                </a:solidFill>
+                <a:effectLst/>
+                <a:latin typeface="+mn-lt"/>
+                <a:ea typeface="+mn-ea"/>
+                <a:cs typeface="+mn-cs"/>
+              </a:rPr>
+              <a:t>workspace/</a:t>
+            </a:r>
+            <a:r>
+              <a:rPr lang="en-GB" sz="1200" b="1" i="0" u="none" strike="noStrike" kern="1200" dirty="0" err="1">
+                <a:solidFill>
+                  <a:schemeClr val="tx1"/>
+                </a:solidFill>
+                <a:effectLst/>
+                <a:latin typeface="+mn-lt"/>
+                <a:ea typeface="+mn-ea"/>
+                <a:cs typeface="+mn-cs"/>
+              </a:rPr>
+              <a:t>src</a:t>
+            </a:r>
+            <a:r>
+              <a:rPr lang="en-GB" sz="1200" b="1" i="0" u="none" strike="noStrike" kern="1200" dirty="0">
+                <a:solidFill>
+                  <a:schemeClr val="tx1"/>
+                </a:solidFill>
+                <a:effectLst/>
+                <a:latin typeface="+mn-lt"/>
+                <a:ea typeface="+mn-ea"/>
+                <a:cs typeface="+mn-cs"/>
+              </a:rPr>
+              <a:t>/</a:t>
+            </a:r>
+            <a:r>
+              <a:rPr lang="en-GB" sz="1200" b="1" i="0" u="none" strike="noStrike" kern="1200" dirty="0" err="1">
+                <a:solidFill>
+                  <a:schemeClr val="tx1"/>
+                </a:solidFill>
+                <a:effectLst/>
+                <a:latin typeface="+mn-lt"/>
+                <a:ea typeface="+mn-ea"/>
+                <a:cs typeface="+mn-cs"/>
+              </a:rPr>
+              <a:t>mavlink</a:t>
+            </a:r>
+            <a:r>
+              <a:rPr lang="en-GB" sz="1200" b="1" i="0" u="none" strike="noStrike" kern="1200" dirty="0">
+                <a:solidFill>
+                  <a:schemeClr val="tx1"/>
+                </a:solidFill>
+                <a:effectLst/>
+                <a:latin typeface="+mn-lt"/>
+                <a:ea typeface="+mn-ea"/>
+                <a:cs typeface="+mn-cs"/>
+              </a:rPr>
+              <a:t>/</a:t>
+            </a:r>
+            <a:r>
+              <a:rPr lang="en-GB" sz="1200" b="1" i="0" u="none" strike="noStrike" kern="1200" dirty="0" err="1">
+                <a:solidFill>
+                  <a:schemeClr val="tx1"/>
+                </a:solidFill>
+                <a:effectLst/>
+                <a:latin typeface="+mn-lt"/>
+                <a:ea typeface="+mn-ea"/>
+                <a:cs typeface="+mn-cs"/>
+              </a:rPr>
+              <a:t>message_definitions</a:t>
+            </a:r>
+            <a:r>
+              <a:rPr lang="en-GB" sz="1200" b="1" i="0" u="none" strike="noStrike" kern="1200" dirty="0">
+                <a:solidFill>
+                  <a:schemeClr val="tx1"/>
+                </a:solidFill>
+                <a:effectLst/>
+                <a:latin typeface="+mn-lt"/>
+                <a:ea typeface="+mn-ea"/>
+                <a:cs typeface="+mn-cs"/>
+              </a:rPr>
+              <a:t>/v1.0</a:t>
+            </a:r>
+            <a:r>
+              <a:rPr lang="en-GB" sz="1200" b="0" i="0" u="none" strike="noStrike" kern="1200" dirty="0">
+                <a:solidFill>
+                  <a:schemeClr val="tx1"/>
+                </a:solidFill>
+                <a:effectLst/>
+                <a:latin typeface="+mn-lt"/>
+                <a:ea typeface="+mn-ea"/>
+                <a:cs typeface="+mn-cs"/>
+              </a:rPr>
+              <a:t>),</a:t>
+            </a:r>
+          </a:p>
+          <a:p>
+            <a:endParaRPr lang="en-GB" sz="1200" b="0" i="0" u="none" strike="noStrike" kern="1200" dirty="0">
+              <a:solidFill>
+                <a:schemeClr val="tx1"/>
+              </a:solidFill>
+              <a:effectLst/>
+              <a:latin typeface="+mn-lt"/>
+              <a:ea typeface="+mn-ea"/>
+              <a:cs typeface="+mn-cs"/>
+            </a:endParaRPr>
+          </a:p>
+          <a:p>
+            <a:endParaRPr lang="en-GB" sz="1200" b="0" i="0" u="none" strike="noStrike" kern="1200" dirty="0">
+              <a:solidFill>
+                <a:schemeClr val="tx1"/>
+              </a:solidFill>
+              <a:effectLst/>
+              <a:latin typeface="+mn-lt"/>
+              <a:ea typeface="+mn-ea"/>
+              <a:cs typeface="+mn-cs"/>
+            </a:endParaRPr>
+          </a:p>
+          <a:p>
+            <a:r>
+              <a:rPr lang="en-GB" sz="1200" b="0" i="0" u="none" strike="noStrike" kern="1200" dirty="0">
+                <a:solidFill>
+                  <a:schemeClr val="tx1"/>
+                </a:solidFill>
+                <a:effectLst/>
+                <a:latin typeface="+mn-lt"/>
+                <a:ea typeface="+mn-ea"/>
+                <a:cs typeface="+mn-cs"/>
+              </a:rPr>
+              <a:t>PX4: </a:t>
+            </a:r>
+          </a:p>
+          <a:p>
+            <a:r>
+              <a:rPr lang="en-GB" sz="1200" b="0" i="0" u="none" strike="noStrike" kern="1200" dirty="0">
+                <a:solidFill>
+                  <a:schemeClr val="tx1"/>
+                </a:solidFill>
+                <a:effectLst/>
+                <a:latin typeface="+mn-lt"/>
+                <a:ea typeface="+mn-ea"/>
+                <a:cs typeface="+mn-cs"/>
+              </a:rPr>
+              <a:t>Inside </a:t>
+            </a:r>
+            <a:r>
+              <a:rPr lang="en-GB" sz="1200" b="1" i="0" u="none" strike="noStrike" kern="1200" dirty="0">
+                <a:solidFill>
+                  <a:schemeClr val="tx1"/>
+                </a:solidFill>
+                <a:effectLst/>
+                <a:latin typeface="+mn-lt"/>
+                <a:ea typeface="+mn-ea"/>
+                <a:cs typeface="+mn-cs"/>
+              </a:rPr>
+              <a:t>common.xml</a:t>
+            </a:r>
+            <a:r>
+              <a:rPr lang="en-GB" sz="1200" b="0" i="0" u="none" strike="noStrike" kern="1200" dirty="0">
+                <a:solidFill>
+                  <a:schemeClr val="tx1"/>
+                </a:solidFill>
+                <a:effectLst/>
+                <a:latin typeface="+mn-lt"/>
+                <a:ea typeface="+mn-ea"/>
+                <a:cs typeface="+mn-cs"/>
+              </a:rPr>
+              <a:t> (in </a:t>
+            </a:r>
+            <a:r>
+              <a:rPr lang="en-GB" sz="1200" b="1" i="0" u="none" strike="noStrike" kern="1200" dirty="0">
+                <a:solidFill>
+                  <a:schemeClr val="tx1"/>
+                </a:solidFill>
+                <a:effectLst/>
+                <a:latin typeface="+mn-lt"/>
+                <a:ea typeface="+mn-ea"/>
+                <a:cs typeface="+mn-cs"/>
+              </a:rPr>
+              <a:t>Firmware/</a:t>
+            </a:r>
+            <a:r>
+              <a:rPr lang="en-GB" sz="1200" b="1" i="0" u="none" strike="noStrike" kern="1200" dirty="0" err="1">
+                <a:solidFill>
+                  <a:schemeClr val="tx1"/>
+                </a:solidFill>
+                <a:effectLst/>
+                <a:latin typeface="+mn-lt"/>
+                <a:ea typeface="+mn-ea"/>
+                <a:cs typeface="+mn-cs"/>
+              </a:rPr>
+              <a:t>mavlink</a:t>
+            </a:r>
+            <a:r>
+              <a:rPr lang="en-GB" sz="1200" b="1" i="0" u="none" strike="noStrike" kern="1200" dirty="0">
+                <a:solidFill>
+                  <a:schemeClr val="tx1"/>
+                </a:solidFill>
+                <a:effectLst/>
+                <a:latin typeface="+mn-lt"/>
+                <a:ea typeface="+mn-ea"/>
+                <a:cs typeface="+mn-cs"/>
+              </a:rPr>
+              <a:t>/include/</a:t>
+            </a:r>
+            <a:r>
+              <a:rPr lang="en-GB" sz="1200" b="1" i="0" u="none" strike="noStrike" kern="1200" dirty="0" err="1">
+                <a:solidFill>
+                  <a:schemeClr val="tx1"/>
+                </a:solidFill>
+                <a:effectLst/>
+                <a:latin typeface="+mn-lt"/>
+                <a:ea typeface="+mn-ea"/>
+                <a:cs typeface="+mn-cs"/>
+              </a:rPr>
+              <a:t>mavlink</a:t>
+            </a:r>
+            <a:r>
+              <a:rPr lang="en-GB" sz="1200" b="1" i="0" u="none" strike="noStrike" kern="1200" dirty="0">
+                <a:solidFill>
+                  <a:schemeClr val="tx1"/>
+                </a:solidFill>
+                <a:effectLst/>
+                <a:latin typeface="+mn-lt"/>
+                <a:ea typeface="+mn-ea"/>
+                <a:cs typeface="+mn-cs"/>
+              </a:rPr>
+              <a:t>/v2.0/</a:t>
+            </a:r>
+            <a:r>
+              <a:rPr lang="en-GB" sz="1200" b="1" i="0" u="none" strike="noStrike" kern="1200" dirty="0" err="1">
+                <a:solidFill>
+                  <a:schemeClr val="tx1"/>
+                </a:solidFill>
+                <a:effectLst/>
+                <a:latin typeface="+mn-lt"/>
+                <a:ea typeface="+mn-ea"/>
+                <a:cs typeface="+mn-cs"/>
+              </a:rPr>
+              <a:t>message_definitions</a:t>
+            </a:r>
+            <a:r>
+              <a:rPr lang="en-GB" sz="1200" b="0" i="0" u="none" strike="noStrike" kern="1200" dirty="0">
+                <a:solidFill>
+                  <a:schemeClr val="tx1"/>
+                </a:solidFill>
+                <a:effectLst/>
+                <a:latin typeface="+mn-lt"/>
+                <a:ea typeface="+mn-ea"/>
+                <a:cs typeface="+mn-cs"/>
+              </a:rPr>
+              <a:t>), add your </a:t>
+            </a:r>
+            <a:r>
+              <a:rPr lang="en-GB" sz="1200" b="0" i="0" u="none" strike="noStrike" kern="1200" dirty="0" err="1">
+                <a:solidFill>
+                  <a:schemeClr val="tx1"/>
+                </a:solidFill>
+                <a:effectLst/>
+                <a:latin typeface="+mn-lt"/>
+                <a:ea typeface="+mn-ea"/>
+                <a:cs typeface="+mn-cs"/>
+              </a:rPr>
+              <a:t>MAVLink</a:t>
+            </a:r>
+            <a:r>
+              <a:rPr lang="en-GB" sz="1200" b="0" i="0" u="none" strike="noStrike" kern="1200" dirty="0">
+                <a:solidFill>
+                  <a:schemeClr val="tx1"/>
+                </a:solidFill>
+                <a:effectLst/>
+                <a:latin typeface="+mn-lt"/>
+                <a:ea typeface="+mn-ea"/>
+                <a:cs typeface="+mn-cs"/>
+              </a:rPr>
+              <a:t> message as following (same procedure as for MAVROS section above):</a:t>
+            </a:r>
+            <a:endParaRPr lang="en-US" dirty="0"/>
+          </a:p>
+          <a:p>
+            <a:endParaRPr lang="en-US" dirty="0"/>
+          </a:p>
+        </p:txBody>
+      </p:sp>
+      <p:sp>
+        <p:nvSpPr>
+          <p:cNvPr id="4" name="Slide Number Placeholder 3"/>
+          <p:cNvSpPr>
+            <a:spLocks noGrp="1"/>
+          </p:cNvSpPr>
+          <p:nvPr>
+            <p:ph type="sldNum" sz="quarter" idx="5"/>
+          </p:nvPr>
+        </p:nvSpPr>
+        <p:spPr/>
+        <p:txBody>
+          <a:bodyPr/>
+          <a:lstStyle/>
+          <a:p>
+            <a:fld id="{E5E98293-A3F4-4328-805F-E78DF072D2D2}" type="slidenum">
+              <a:rPr lang="en-US" smtClean="0"/>
+              <a:t>23</a:t>
+            </a:fld>
+            <a:endParaRPr lang="en-US"/>
+          </a:p>
+        </p:txBody>
+      </p:sp>
+    </p:spTree>
+    <p:extLst>
+      <p:ext uri="{BB962C8B-B14F-4D97-AF65-F5344CB8AC3E}">
+        <p14:creationId xmlns:p14="http://schemas.microsoft.com/office/powerpoint/2010/main" val="1002529916"/>
+      </p:ext>
+    </p:extLst>
+  </p:cSld>
+  <p:clrMapOvr>
+    <a:masterClrMapping/>
+  </p:clrMapOvr>
+</p:notes>
+</file>
+
+<file path=ppt/notesSlides/notesSlide5.xml><?xml version="1.0" encoding="utf-8"?>
+<p:notes xmlns:a="http://schemas.openxmlformats.org/drawingml/2006/main" xmlns:r="http://schemas.openxmlformats.org/officeDocument/2006/relationships" xmlns:p="http://schemas.openxmlformats.org/presentationml/2006/main">
+  <p:cSld>
+    <p:spTree>
+      <p:nvGrpSpPr>
+        <p:cNvPr id="1" name=""/>
+        <p:cNvGrpSpPr/>
+        <p:nvPr/>
+      </p:nvGrpSpPr>
+      <p:grpSpPr>
+        <a:xfrm>
+          <a:off x="0" y="0"/>
+          <a:ext cx="0" cy="0"/>
+          <a:chOff x="0" y="0"/>
+          <a:chExt cx="0" cy="0"/>
+        </a:xfrm>
+      </p:grpSpPr>
+      <p:sp>
+        <p:nvSpPr>
+          <p:cNvPr id="2" name="Slide Image Placeholder 1"/>
+          <p:cNvSpPr>
+            <a:spLocks noGrp="1" noRot="1" noChangeAspect="1"/>
+          </p:cNvSpPr>
+          <p:nvPr>
+            <p:ph type="sldImg"/>
+          </p:nvPr>
+        </p:nvSpPr>
+        <p:spPr/>
+      </p:sp>
+      <p:sp>
+        <p:nvSpPr>
+          <p:cNvPr id="3" name="Notes Placeholder 2"/>
+          <p:cNvSpPr>
+            <a:spLocks noGrp="1"/>
+          </p:cNvSpPr>
+          <p:nvPr>
+            <p:ph type="body" idx="1"/>
+          </p:nvPr>
+        </p:nvSpPr>
+        <p:spPr/>
+        <p:txBody>
+          <a:bodyPr/>
+          <a:lstStyle/>
+          <a:p>
+            <a:r>
               <a:rPr lang="en-GB" sz="1200" b="0" i="0" u="none" strike="noStrike" kern="1200" dirty="0">
                 <a:solidFill>
                   <a:schemeClr val="tx1"/>
@@ -1600,7 +1728,7 @@
 </p:notes>
 </file>
 
-<file path=ppt/notesSlides/notesSlide5.xml><?xml version="1.0" encoding="utf-8"?>
+<file path=ppt/notesSlides/notesSlide6.xml><?xml version="1.0" encoding="utf-8"?>
 <p:notes xmlns:a="http://schemas.openxmlformats.org/drawingml/2006/main" xmlns:r="http://schemas.openxmlformats.org/officeDocument/2006/relationships" xmlns:p="http://schemas.openxmlformats.org/presentationml/2006/main">
   <p:cSld>
     <p:spTree>
@@ -1846,7 +1974,7 @@
           <a:p>
             <a:fld id="{41EBDC03-B927-4A4C-9E1D-8B3F10FC1839}" type="datetimeFigureOut">
               <a:rPr lang="en-US" smtClean="0"/>
-              <a:t>4/14/2020</a:t>
+              <a:t>4/15/2020</a:t>
             </a:fld>
             <a:endParaRPr lang="en-US"/>
           </a:p>
@@ -2044,7 +2172,7 @@
           <a:p>
             <a:fld id="{41EBDC03-B927-4A4C-9E1D-8B3F10FC1839}" type="datetimeFigureOut">
               <a:rPr lang="en-US" smtClean="0"/>
-              <a:t>4/14/2020</a:t>
+              <a:t>4/15/2020</a:t>
             </a:fld>
             <a:endParaRPr lang="en-US"/>
           </a:p>
@@ -2252,7 +2380,7 @@
           <a:p>
             <a:fld id="{41EBDC03-B927-4A4C-9E1D-8B3F10FC1839}" type="datetimeFigureOut">
               <a:rPr lang="en-US" smtClean="0"/>
-              <a:t>4/14/2020</a:t>
+              <a:t>4/15/2020</a:t>
             </a:fld>
             <a:endParaRPr lang="en-US"/>
           </a:p>
@@ -2450,7 +2578,7 @@
           <a:p>
             <a:fld id="{41EBDC03-B927-4A4C-9E1D-8B3F10FC1839}" type="datetimeFigureOut">
               <a:rPr lang="en-US" smtClean="0"/>
-              <a:t>4/14/2020</a:t>
+              <a:t>4/15/2020</a:t>
             </a:fld>
             <a:endParaRPr lang="en-US"/>
           </a:p>
@@ -2725,7 +2853,7 @@
           <a:p>
             <a:fld id="{41EBDC03-B927-4A4C-9E1D-8B3F10FC1839}" type="datetimeFigureOut">
               <a:rPr lang="en-US" smtClean="0"/>
-              <a:t>4/14/2020</a:t>
+              <a:t>4/15/2020</a:t>
             </a:fld>
             <a:endParaRPr lang="en-US"/>
           </a:p>
@@ -2990,7 +3118,7 @@
           <a:p>
             <a:fld id="{41EBDC03-B927-4A4C-9E1D-8B3F10FC1839}" type="datetimeFigureOut">
               <a:rPr lang="en-US" smtClean="0"/>
-              <a:t>4/14/2020</a:t>
+              <a:t>4/15/2020</a:t>
             </a:fld>
             <a:endParaRPr lang="en-US"/>
           </a:p>
@@ -3402,7 +3530,7 @@
           <a:p>
             <a:fld id="{41EBDC03-B927-4A4C-9E1D-8B3F10FC1839}" type="datetimeFigureOut">
               <a:rPr lang="en-US" smtClean="0"/>
-              <a:t>4/14/2020</a:t>
+              <a:t>4/15/2020</a:t>
             </a:fld>
             <a:endParaRPr lang="en-US"/>
           </a:p>
@@ -3543,7 +3671,7 @@
           <a:p>
             <a:fld id="{41EBDC03-B927-4A4C-9E1D-8B3F10FC1839}" type="datetimeFigureOut">
               <a:rPr lang="en-US" smtClean="0"/>
-              <a:t>4/14/2020</a:t>
+              <a:t>4/15/2020</a:t>
             </a:fld>
             <a:endParaRPr lang="en-US"/>
           </a:p>
@@ -3656,7 +3784,7 @@
           <a:p>
             <a:fld id="{41EBDC03-B927-4A4C-9E1D-8B3F10FC1839}" type="datetimeFigureOut">
               <a:rPr lang="en-US" smtClean="0"/>
-              <a:t>4/14/2020</a:t>
+              <a:t>4/15/2020</a:t>
             </a:fld>
             <a:endParaRPr lang="en-US"/>
           </a:p>
@@ -3967,7 +4095,7 @@
           <a:p>
             <a:fld id="{41EBDC03-B927-4A4C-9E1D-8B3F10FC1839}" type="datetimeFigureOut">
               <a:rPr lang="en-US" smtClean="0"/>
-              <a:t>4/14/2020</a:t>
+              <a:t>4/15/2020</a:t>
             </a:fld>
             <a:endParaRPr lang="en-US"/>
           </a:p>
@@ -4255,7 +4383,7 @@
           <a:p>
             <a:fld id="{41EBDC03-B927-4A4C-9E1D-8B3F10FC1839}" type="datetimeFigureOut">
               <a:rPr lang="en-US" smtClean="0"/>
-              <a:t>4/14/2020</a:t>
+              <a:t>4/15/2020</a:t>
             </a:fld>
             <a:endParaRPr lang="en-US"/>
           </a:p>
@@ -4496,7 +4624,7 @@
           <a:p>
             <a:fld id="{41EBDC03-B927-4A4C-9E1D-8B3F10FC1839}" type="datetimeFigureOut">
               <a:rPr lang="en-US" smtClean="0"/>
-              <a:t>4/14/2020</a:t>
+              <a:t>4/15/2020</a:t>
             </a:fld>
             <a:endParaRPr lang="en-US"/>
           </a:p>
@@ -4982,6 +5110,15 @@
               <a:t>Thesis Defense on April 15, 2020</a:t>
             </a:r>
           </a:p>
+          <a:p>
+            <a:endParaRPr lang="en-US" dirty="0"/>
+          </a:p>
+          <a:p>
+            <a:r>
+              <a:rPr lang="en-US" dirty="0"/>
+              <a:t>Basharnavaz Khan</a:t>
+            </a:r>
+          </a:p>
         </p:txBody>
       </p:sp>
     </p:spTree>
@@ -5112,7 +5249,7 @@
           <p:nvPr/>
         </p:nvPicPr>
         <p:blipFill>
-          <a:blip r:embed="rId2"/>
+          <a:blip r:embed="rId3"/>
           <a:stretch>
             <a:fillRect/>
           </a:stretch>
@@ -5142,7 +5279,7 @@
           <p:nvPr/>
         </p:nvPicPr>
         <p:blipFill>
-          <a:blip r:embed="rId3"/>
+          <a:blip r:embed="rId4"/>
           <a:stretch>
             <a:fillRect/>
           </a:stretch>
@@ -6482,7 +6619,7 @@
           <a:p>
             <a:r>
               <a:rPr lang="en-US" dirty="0"/>
-              <a:t>Development of Signal Differentiator</a:t>
+              <a:t>Mathematical Development</a:t>
             </a:r>
           </a:p>
           <a:p>
@@ -9069,13 +9206,13 @@
           <a:p>
             <a:r>
               <a:rPr lang="en-GB" dirty="0"/>
-              <a:t>Develop kernel-based algebraic differentiators will employ a fourth-order LTI structure over a moving window in conjunction with dynamic ridge regression. </a:t>
+              <a:t>Develop kernel-based algebraic differentiators that employ a fourth-order LTI structure over a moving window in conjunction with dynamic ridge regression to estimate external disturbances on the quadcopter</a:t>
             </a:r>
           </a:p>
           <a:p>
             <a:r>
               <a:rPr lang="en-GB" dirty="0"/>
-              <a:t>Compare the performance of three different observers in closed-loop with a tracking control of a quadcopter</a:t>
+              <a:t>Compare the performance of the developed observer against observers in literature in closed-loop with a tracking control of a quadcopter in simulation and on a practical setup</a:t>
             </a:r>
             <a:endParaRPr lang="en-US" dirty="0"/>
           </a:p>

</xml_diff>